<commit_message>
update hands-on documents for receiver and sender adapter flows
</commit_message>
<xml_diff>
--- a/doc/contoso-receiver-adapter.pptx
+++ b/doc/contoso-receiver-adapter.pptx
@@ -5,7 +5,10 @@
     <p:sldMasterId id="2147483648" r:id="rId1"/>
   </p:sldMasterIdLst>
   <p:sldIdLst>
-    <p:sldId id="257" r:id="rId2"/>
+    <p:sldId id="258" r:id="rId2"/>
+    <p:sldId id="257" r:id="rId3"/>
+    <p:sldId id="259" r:id="rId4"/>
+    <p:sldId id="260" r:id="rId5"/>
   </p:sldIdLst>
   <p:sldSz cx="12192000" cy="6858000"/>
   <p:notesSz cx="6858000" cy="9144000"/>
@@ -104,6 +107,11 @@
       </a:defRPr>
     </a:lvl9pPr>
   </p:defaultTextStyle>
+  <p:extLst>
+    <p:ext uri="{EFAFB233-063F-42B5-8137-9DF3F51BA10A}">
+      <p15:sldGuideLst xmlns:p15="http://schemas.microsoft.com/office/powerpoint/2012/main"/>
+    </p:ext>
+  </p:extLst>
 </p:presentation>
 </file>
 
@@ -254,7 +262,7 @@
           <a:p>
             <a:fld id="{1122A823-5F4A-4045-9E50-39BA17C87DDC}" type="datetimeFigureOut">
               <a:rPr lang="zh-TW" altLang="en-US" smtClean="0"/>
-              <a:t>2018/6/19</a:t>
+              <a:t>2018/6/20</a:t>
             </a:fld>
             <a:endParaRPr lang="zh-TW" altLang="en-US"/>
           </a:p>
@@ -452,7 +460,7 @@
           <a:p>
             <a:fld id="{1122A823-5F4A-4045-9E50-39BA17C87DDC}" type="datetimeFigureOut">
               <a:rPr lang="zh-TW" altLang="en-US" smtClean="0"/>
-              <a:t>2018/6/19</a:t>
+              <a:t>2018/6/20</a:t>
             </a:fld>
             <a:endParaRPr lang="zh-TW" altLang="en-US"/>
           </a:p>
@@ -660,7 +668,7 @@
           <a:p>
             <a:fld id="{1122A823-5F4A-4045-9E50-39BA17C87DDC}" type="datetimeFigureOut">
               <a:rPr lang="zh-TW" altLang="en-US" smtClean="0"/>
-              <a:t>2018/6/19</a:t>
+              <a:t>2018/6/20</a:t>
             </a:fld>
             <a:endParaRPr lang="zh-TW" altLang="en-US"/>
           </a:p>
@@ -858,7 +866,7 @@
           <a:p>
             <a:fld id="{1122A823-5F4A-4045-9E50-39BA17C87DDC}" type="datetimeFigureOut">
               <a:rPr lang="zh-TW" altLang="en-US" smtClean="0"/>
-              <a:t>2018/6/19</a:t>
+              <a:t>2018/6/20</a:t>
             </a:fld>
             <a:endParaRPr lang="zh-TW" altLang="en-US"/>
           </a:p>
@@ -1133,7 +1141,7 @@
           <a:p>
             <a:fld id="{1122A823-5F4A-4045-9E50-39BA17C87DDC}" type="datetimeFigureOut">
               <a:rPr lang="zh-TW" altLang="en-US" smtClean="0"/>
-              <a:t>2018/6/19</a:t>
+              <a:t>2018/6/20</a:t>
             </a:fld>
             <a:endParaRPr lang="zh-TW" altLang="en-US"/>
           </a:p>
@@ -1398,7 +1406,7 @@
           <a:p>
             <a:fld id="{1122A823-5F4A-4045-9E50-39BA17C87DDC}" type="datetimeFigureOut">
               <a:rPr lang="zh-TW" altLang="en-US" smtClean="0"/>
-              <a:t>2018/6/19</a:t>
+              <a:t>2018/6/20</a:t>
             </a:fld>
             <a:endParaRPr lang="zh-TW" altLang="en-US"/>
           </a:p>
@@ -1810,7 +1818,7 @@
           <a:p>
             <a:fld id="{1122A823-5F4A-4045-9E50-39BA17C87DDC}" type="datetimeFigureOut">
               <a:rPr lang="zh-TW" altLang="en-US" smtClean="0"/>
-              <a:t>2018/6/19</a:t>
+              <a:t>2018/6/20</a:t>
             </a:fld>
             <a:endParaRPr lang="zh-TW" altLang="en-US"/>
           </a:p>
@@ -1951,7 +1959,7 @@
           <a:p>
             <a:fld id="{1122A823-5F4A-4045-9E50-39BA17C87DDC}" type="datetimeFigureOut">
               <a:rPr lang="zh-TW" altLang="en-US" smtClean="0"/>
-              <a:t>2018/6/19</a:t>
+              <a:t>2018/6/20</a:t>
             </a:fld>
             <a:endParaRPr lang="zh-TW" altLang="en-US"/>
           </a:p>
@@ -2064,7 +2072,7 @@
           <a:p>
             <a:fld id="{1122A823-5F4A-4045-9E50-39BA17C87DDC}" type="datetimeFigureOut">
               <a:rPr lang="zh-TW" altLang="en-US" smtClean="0"/>
-              <a:t>2018/6/19</a:t>
+              <a:t>2018/6/20</a:t>
             </a:fld>
             <a:endParaRPr lang="zh-TW" altLang="en-US"/>
           </a:p>
@@ -2375,7 +2383,7 @@
           <a:p>
             <a:fld id="{1122A823-5F4A-4045-9E50-39BA17C87DDC}" type="datetimeFigureOut">
               <a:rPr lang="zh-TW" altLang="en-US" smtClean="0"/>
-              <a:t>2018/6/19</a:t>
+              <a:t>2018/6/20</a:t>
             </a:fld>
             <a:endParaRPr lang="zh-TW" altLang="en-US"/>
           </a:p>
@@ -2663,7 +2671,7 @@
           <a:p>
             <a:fld id="{1122A823-5F4A-4045-9E50-39BA17C87DDC}" type="datetimeFigureOut">
               <a:rPr lang="zh-TW" altLang="en-US" smtClean="0"/>
-              <a:t>2018/6/19</a:t>
+              <a:t>2018/6/20</a:t>
             </a:fld>
             <a:endParaRPr lang="zh-TW" altLang="en-US"/>
           </a:p>
@@ -2904,7 +2912,7 @@
           <a:p>
             <a:fld id="{1122A823-5F4A-4045-9E50-39BA17C87DDC}" type="datetimeFigureOut">
               <a:rPr lang="zh-TW" altLang="en-US" smtClean="0"/>
-              <a:t>2018/6/19</a:t>
+              <a:t>2018/6/20</a:t>
             </a:fld>
             <a:endParaRPr lang="zh-TW" altLang="en-US"/>
           </a:p>
@@ -3323,6 +3331,90 @@
       </p:grpSpPr>
       <p:sp>
         <p:nvSpPr>
+          <p:cNvPr id="2" name="Title 1">
+            <a:extLst>
+              <a:ext uri="{FF2B5EF4-FFF2-40B4-BE49-F238E27FC236}">
+                <a16:creationId xmlns:a16="http://schemas.microsoft.com/office/drawing/2014/main" id="{218F396E-FC8E-4497-972D-5E37BD75B6AF}"/>
+              </a:ext>
+            </a:extLst>
+          </p:cNvPr>
+          <p:cNvSpPr>
+            <a:spLocks noGrp="1"/>
+          </p:cNvSpPr>
+          <p:nvPr>
+            <p:ph type="ctrTitle"/>
+          </p:nvPr>
+        </p:nvSpPr>
+        <p:spPr/>
+        <p:txBody>
+          <a:bodyPr/>
+          <a:lstStyle/>
+          <a:p>
+            <a:r>
+              <a:rPr lang="en-US" altLang="zh-TW" dirty="0"/>
+              <a:t>Receiver Adapter</a:t>
+            </a:r>
+            <a:endParaRPr lang="en-US" dirty="0"/>
+          </a:p>
+        </p:txBody>
+      </p:sp>
+      <p:sp>
+        <p:nvSpPr>
+          <p:cNvPr id="3" name="Subtitle 2">
+            <a:extLst>
+              <a:ext uri="{FF2B5EF4-FFF2-40B4-BE49-F238E27FC236}">
+                <a16:creationId xmlns:a16="http://schemas.microsoft.com/office/drawing/2014/main" id="{A9A5A540-AA88-4AAA-9347-1D205CC00D30}"/>
+              </a:ext>
+            </a:extLst>
+          </p:cNvPr>
+          <p:cNvSpPr>
+            <a:spLocks noGrp="1"/>
+          </p:cNvSpPr>
+          <p:nvPr>
+            <p:ph type="subTitle" idx="1"/>
+          </p:nvPr>
+        </p:nvSpPr>
+        <p:spPr/>
+        <p:txBody>
+          <a:bodyPr/>
+          <a:lstStyle/>
+          <a:p>
+            <a:endParaRPr lang="en-US"/>
+          </a:p>
+        </p:txBody>
+      </p:sp>
+    </p:spTree>
+    <p:extLst>
+      <p:ext uri="{BB962C8B-B14F-4D97-AF65-F5344CB8AC3E}">
+        <p14:creationId xmlns:p14="http://schemas.microsoft.com/office/powerpoint/2010/main" val="2581223940"/>
+      </p:ext>
+    </p:extLst>
+  </p:cSld>
+  <p:clrMapOvr>
+    <a:masterClrMapping/>
+  </p:clrMapOvr>
+</p:sld>
+</file>
+
+<file path=ppt/slides/slide2.xml><?xml version="1.0" encoding="utf-8"?>
+<p:sld xmlns:a="http://schemas.openxmlformats.org/drawingml/2006/main" xmlns:r="http://schemas.openxmlformats.org/officeDocument/2006/relationships" xmlns:p="http://schemas.openxmlformats.org/presentationml/2006/main">
+  <p:cSld>
+    <p:spTree>
+      <p:nvGrpSpPr>
+        <p:cNvPr id="1" name=""/>
+        <p:cNvGrpSpPr/>
+        <p:nvPr/>
+      </p:nvGrpSpPr>
+      <p:grpSpPr>
+        <a:xfrm>
+          <a:off x="0" y="0"/>
+          <a:ext cx="0" cy="0"/>
+          <a:chOff x="0" y="0"/>
+          <a:chExt cx="0" cy="0"/>
+        </a:xfrm>
+      </p:grpSpPr>
+      <p:sp>
+        <p:nvSpPr>
           <p:cNvPr id="4" name="矩形 3">
             <a:extLst>
               <a:ext uri="{FF2B5EF4-FFF2-40B4-BE49-F238E27FC236}">
@@ -3900,6 +3992,502 @@
     <p:extLst>
       <p:ext uri="{BB962C8B-B14F-4D97-AF65-F5344CB8AC3E}">
         <p14:creationId xmlns:p14="http://schemas.microsoft.com/office/powerpoint/2010/main" val="3280458136"/>
+      </p:ext>
+    </p:extLst>
+  </p:cSld>
+  <p:clrMapOvr>
+    <a:masterClrMapping/>
+  </p:clrMapOvr>
+</p:sld>
+</file>
+
+<file path=ppt/slides/slide3.xml><?xml version="1.0" encoding="utf-8"?>
+<p:sld xmlns:a="http://schemas.openxmlformats.org/drawingml/2006/main" xmlns:r="http://schemas.openxmlformats.org/officeDocument/2006/relationships" xmlns:p="http://schemas.openxmlformats.org/presentationml/2006/main">
+  <p:cSld>
+    <p:spTree>
+      <p:nvGrpSpPr>
+        <p:cNvPr id="1" name=""/>
+        <p:cNvGrpSpPr/>
+        <p:nvPr/>
+      </p:nvGrpSpPr>
+      <p:grpSpPr>
+        <a:xfrm>
+          <a:off x="0" y="0"/>
+          <a:ext cx="0" cy="0"/>
+          <a:chOff x="0" y="0"/>
+          <a:chExt cx="0" cy="0"/>
+        </a:xfrm>
+      </p:grpSpPr>
+      <p:sp>
+        <p:nvSpPr>
+          <p:cNvPr id="2" name="Title 1">
+            <a:extLst>
+              <a:ext uri="{FF2B5EF4-FFF2-40B4-BE49-F238E27FC236}">
+                <a16:creationId xmlns:a16="http://schemas.microsoft.com/office/drawing/2014/main" id="{218F396E-FC8E-4497-972D-5E37BD75B6AF}"/>
+              </a:ext>
+            </a:extLst>
+          </p:cNvPr>
+          <p:cNvSpPr>
+            <a:spLocks noGrp="1"/>
+          </p:cNvSpPr>
+          <p:nvPr>
+            <p:ph type="ctrTitle"/>
+          </p:nvPr>
+        </p:nvSpPr>
+        <p:spPr/>
+        <p:txBody>
+          <a:bodyPr/>
+          <a:lstStyle/>
+          <a:p>
+            <a:r>
+              <a:rPr lang="en-US" altLang="zh-TW" dirty="0"/>
+              <a:t>Sender Adapter</a:t>
+            </a:r>
+            <a:endParaRPr lang="en-US" dirty="0"/>
+          </a:p>
+        </p:txBody>
+      </p:sp>
+      <p:sp>
+        <p:nvSpPr>
+          <p:cNvPr id="3" name="Subtitle 2">
+            <a:extLst>
+              <a:ext uri="{FF2B5EF4-FFF2-40B4-BE49-F238E27FC236}">
+                <a16:creationId xmlns:a16="http://schemas.microsoft.com/office/drawing/2014/main" id="{A9A5A540-AA88-4AAA-9347-1D205CC00D30}"/>
+              </a:ext>
+            </a:extLst>
+          </p:cNvPr>
+          <p:cNvSpPr>
+            <a:spLocks noGrp="1"/>
+          </p:cNvSpPr>
+          <p:nvPr>
+            <p:ph type="subTitle" idx="1"/>
+          </p:nvPr>
+        </p:nvSpPr>
+        <p:spPr/>
+        <p:txBody>
+          <a:bodyPr/>
+          <a:lstStyle/>
+          <a:p>
+            <a:endParaRPr lang="en-US"/>
+          </a:p>
+        </p:txBody>
+      </p:sp>
+    </p:spTree>
+    <p:extLst>
+      <p:ext uri="{BB962C8B-B14F-4D97-AF65-F5344CB8AC3E}">
+        <p14:creationId xmlns:p14="http://schemas.microsoft.com/office/powerpoint/2010/main" val="2945557282"/>
+      </p:ext>
+    </p:extLst>
+  </p:cSld>
+  <p:clrMapOvr>
+    <a:masterClrMapping/>
+  </p:clrMapOvr>
+</p:sld>
+</file>
+
+<file path=ppt/slides/slide4.xml><?xml version="1.0" encoding="utf-8"?>
+<p:sld xmlns:a="http://schemas.openxmlformats.org/drawingml/2006/main" xmlns:r="http://schemas.openxmlformats.org/officeDocument/2006/relationships" xmlns:p="http://schemas.openxmlformats.org/presentationml/2006/main">
+  <p:cSld>
+    <p:spTree>
+      <p:nvGrpSpPr>
+        <p:cNvPr id="1" name=""/>
+        <p:cNvGrpSpPr/>
+        <p:nvPr/>
+      </p:nvGrpSpPr>
+      <p:grpSpPr>
+        <a:xfrm>
+          <a:off x="0" y="0"/>
+          <a:ext cx="0" cy="0"/>
+          <a:chOff x="0" y="0"/>
+          <a:chExt cx="0" cy="0"/>
+        </a:xfrm>
+      </p:grpSpPr>
+      <p:sp>
+        <p:nvSpPr>
+          <p:cNvPr id="4" name="矩形 3">
+            <a:extLst>
+              <a:ext uri="{FF2B5EF4-FFF2-40B4-BE49-F238E27FC236}">
+                <a16:creationId xmlns:a16="http://schemas.microsoft.com/office/drawing/2014/main" id="{0622969E-0215-45EA-86FA-8ABB01D87DFC}"/>
+              </a:ext>
+            </a:extLst>
+          </p:cNvPr>
+          <p:cNvSpPr/>
+          <p:nvPr/>
+        </p:nvSpPr>
+        <p:spPr>
+          <a:xfrm>
+            <a:off x="1205948" y="490330"/>
+            <a:ext cx="2504661" cy="1417983"/>
+          </a:xfrm>
+          <a:prstGeom prst="rect">
+            <a:avLst/>
+          </a:prstGeom>
+        </p:spPr>
+        <p:style>
+          <a:lnRef idx="2">
+            <a:schemeClr val="accent1">
+              <a:shade val="50000"/>
+            </a:schemeClr>
+          </a:lnRef>
+          <a:fillRef idx="1">
+            <a:schemeClr val="accent1"/>
+          </a:fillRef>
+          <a:effectRef idx="0">
+            <a:schemeClr val="accent1"/>
+          </a:effectRef>
+          <a:fontRef idx="minor">
+            <a:schemeClr val="lt1"/>
+          </a:fontRef>
+        </p:style>
+        <p:txBody>
+          <a:bodyPr rtlCol="0" anchor="ctr"/>
+          <a:lstStyle/>
+          <a:p>
+            <a:pPr algn="ctr"/>
+            <a:r>
+              <a:rPr lang="en-US" altLang="zh-TW" dirty="0"/>
+              <a:t>Internal Service Bus Queue</a:t>
+            </a:r>
+            <a:endParaRPr lang="zh-TW" altLang="en-US" dirty="0"/>
+          </a:p>
+        </p:txBody>
+      </p:sp>
+      <p:sp>
+        <p:nvSpPr>
+          <p:cNvPr id="5" name="矩形 4">
+            <a:extLst>
+              <a:ext uri="{FF2B5EF4-FFF2-40B4-BE49-F238E27FC236}">
+                <a16:creationId xmlns:a16="http://schemas.microsoft.com/office/drawing/2014/main" id="{0CEAB53D-9722-48A7-9933-3D4A7FF259CD}"/>
+              </a:ext>
+            </a:extLst>
+          </p:cNvPr>
+          <p:cNvSpPr/>
+          <p:nvPr/>
+        </p:nvSpPr>
+        <p:spPr>
+          <a:xfrm>
+            <a:off x="1205948" y="2720008"/>
+            <a:ext cx="2504661" cy="1417983"/>
+          </a:xfrm>
+          <a:prstGeom prst="rect">
+            <a:avLst/>
+          </a:prstGeom>
+        </p:spPr>
+        <p:style>
+          <a:lnRef idx="2">
+            <a:schemeClr val="accent1">
+              <a:shade val="50000"/>
+            </a:schemeClr>
+          </a:lnRef>
+          <a:fillRef idx="1">
+            <a:schemeClr val="accent1"/>
+          </a:fillRef>
+          <a:effectRef idx="0">
+            <a:schemeClr val="accent1"/>
+          </a:effectRef>
+          <a:fontRef idx="minor">
+            <a:schemeClr val="lt1"/>
+          </a:fontRef>
+        </p:style>
+        <p:txBody>
+          <a:bodyPr rtlCol="0" anchor="ctr"/>
+          <a:lstStyle/>
+          <a:p>
+            <a:pPr algn="ctr"/>
+            <a:r>
+              <a:rPr lang="en-US" altLang="zh-TW" dirty="0"/>
+              <a:t>Timer Trigger</a:t>
+            </a:r>
+            <a:endParaRPr lang="zh-TW" altLang="en-US" dirty="0"/>
+          </a:p>
+        </p:txBody>
+      </p:sp>
+      <p:cxnSp>
+        <p:nvCxnSpPr>
+          <p:cNvPr id="8" name="直線單箭頭接點 7">
+            <a:extLst>
+              <a:ext uri="{FF2B5EF4-FFF2-40B4-BE49-F238E27FC236}">
+                <a16:creationId xmlns:a16="http://schemas.microsoft.com/office/drawing/2014/main" id="{D1420F86-4D51-4F0C-8A90-AA1830F74EB9}"/>
+              </a:ext>
+            </a:extLst>
+          </p:cNvPr>
+          <p:cNvCxnSpPr>
+            <a:stCxn id="4" idx="2"/>
+            <a:endCxn id="5" idx="0"/>
+          </p:cNvCxnSpPr>
+          <p:nvPr/>
+        </p:nvCxnSpPr>
+        <p:spPr>
+          <a:xfrm>
+            <a:off x="2458279" y="1908313"/>
+            <a:ext cx="0" cy="811695"/>
+          </a:xfrm>
+          <a:prstGeom prst="straightConnector1">
+            <a:avLst/>
+          </a:prstGeom>
+          <a:ln>
+            <a:tailEnd type="triangle"/>
+          </a:ln>
+        </p:spPr>
+        <p:style>
+          <a:lnRef idx="1">
+            <a:schemeClr val="accent1"/>
+          </a:lnRef>
+          <a:fillRef idx="0">
+            <a:schemeClr val="accent1"/>
+          </a:fillRef>
+          <a:effectRef idx="0">
+            <a:schemeClr val="accent1"/>
+          </a:effectRef>
+          <a:fontRef idx="minor">
+            <a:schemeClr val="tx1"/>
+          </a:fontRef>
+        </p:style>
+      </p:cxnSp>
+      <p:cxnSp>
+        <p:nvCxnSpPr>
+          <p:cNvPr id="9" name="直線單箭頭接點 8">
+            <a:extLst>
+              <a:ext uri="{FF2B5EF4-FFF2-40B4-BE49-F238E27FC236}">
+                <a16:creationId xmlns:a16="http://schemas.microsoft.com/office/drawing/2014/main" id="{5C894DDB-8AED-4452-9C41-1101A3565C5D}"/>
+              </a:ext>
+            </a:extLst>
+          </p:cNvPr>
+          <p:cNvCxnSpPr>
+            <a:cxnSpLocks/>
+            <a:stCxn id="5" idx="2"/>
+            <a:endCxn id="16" idx="0"/>
+          </p:cNvCxnSpPr>
+          <p:nvPr/>
+        </p:nvCxnSpPr>
+        <p:spPr>
+          <a:xfrm flipH="1">
+            <a:off x="2458278" y="4137991"/>
+            <a:ext cx="1" cy="646040"/>
+          </a:xfrm>
+          <a:prstGeom prst="straightConnector1">
+            <a:avLst/>
+          </a:prstGeom>
+          <a:ln>
+            <a:tailEnd type="triangle"/>
+          </a:ln>
+        </p:spPr>
+        <p:style>
+          <a:lnRef idx="1">
+            <a:schemeClr val="accent1"/>
+          </a:lnRef>
+          <a:fillRef idx="0">
+            <a:schemeClr val="accent1"/>
+          </a:fillRef>
+          <a:effectRef idx="0">
+            <a:schemeClr val="accent1"/>
+          </a:effectRef>
+          <a:fontRef idx="minor">
+            <a:schemeClr val="tx1"/>
+          </a:fontRef>
+        </p:style>
+      </p:cxnSp>
+      <p:sp>
+        <p:nvSpPr>
+          <p:cNvPr id="22" name="矩形 21">
+            <a:extLst>
+              <a:ext uri="{FF2B5EF4-FFF2-40B4-BE49-F238E27FC236}">
+                <a16:creationId xmlns:a16="http://schemas.microsoft.com/office/drawing/2014/main" id="{3251D9CD-4619-466E-8E24-7CC38CC3F415}"/>
+              </a:ext>
+            </a:extLst>
+          </p:cNvPr>
+          <p:cNvSpPr/>
+          <p:nvPr/>
+        </p:nvSpPr>
+        <p:spPr>
+          <a:xfrm>
+            <a:off x="4567651" y="4784031"/>
+            <a:ext cx="2504661" cy="1417983"/>
+          </a:xfrm>
+          <a:prstGeom prst="rect">
+            <a:avLst/>
+          </a:prstGeom>
+        </p:spPr>
+        <p:style>
+          <a:lnRef idx="2">
+            <a:schemeClr val="accent1">
+              <a:shade val="50000"/>
+            </a:schemeClr>
+          </a:lnRef>
+          <a:fillRef idx="1">
+            <a:schemeClr val="accent1"/>
+          </a:fillRef>
+          <a:effectRef idx="0">
+            <a:schemeClr val="accent1"/>
+          </a:effectRef>
+          <a:fontRef idx="minor">
+            <a:schemeClr val="lt1"/>
+          </a:fontRef>
+        </p:style>
+        <p:txBody>
+          <a:bodyPr rtlCol="0" anchor="ctr"/>
+          <a:lstStyle/>
+          <a:p>
+            <a:pPr algn="ctr"/>
+            <a:r>
+              <a:rPr lang="en-US" altLang="zh-TW" dirty="0"/>
+              <a:t>Storage Blob</a:t>
+            </a:r>
+            <a:endParaRPr lang="zh-TW" altLang="en-US" dirty="0"/>
+          </a:p>
+        </p:txBody>
+      </p:sp>
+      <p:cxnSp>
+        <p:nvCxnSpPr>
+          <p:cNvPr id="23" name="直線單箭頭接點 22">
+            <a:extLst>
+              <a:ext uri="{FF2B5EF4-FFF2-40B4-BE49-F238E27FC236}">
+                <a16:creationId xmlns:a16="http://schemas.microsoft.com/office/drawing/2014/main" id="{E4494DF3-4BCB-43AF-ADC3-6878E59BD5E3}"/>
+              </a:ext>
+            </a:extLst>
+          </p:cNvPr>
+          <p:cNvCxnSpPr>
+            <a:cxnSpLocks/>
+            <a:stCxn id="16" idx="3"/>
+            <a:endCxn id="22" idx="1"/>
+          </p:cNvCxnSpPr>
+          <p:nvPr/>
+        </p:nvCxnSpPr>
+        <p:spPr>
+          <a:xfrm>
+            <a:off x="3710608" y="5493023"/>
+            <a:ext cx="857043" cy="0"/>
+          </a:xfrm>
+          <a:prstGeom prst="straightConnector1">
+            <a:avLst/>
+          </a:prstGeom>
+          <a:ln>
+            <a:tailEnd type="triangle"/>
+          </a:ln>
+        </p:spPr>
+        <p:style>
+          <a:lnRef idx="1">
+            <a:schemeClr val="accent1"/>
+          </a:lnRef>
+          <a:fillRef idx="0">
+            <a:schemeClr val="accent1"/>
+          </a:fillRef>
+          <a:effectRef idx="0">
+            <a:schemeClr val="accent1"/>
+          </a:effectRef>
+          <a:fontRef idx="minor">
+            <a:schemeClr val="tx1"/>
+          </a:fontRef>
+        </p:style>
+      </p:cxnSp>
+      <p:sp>
+        <p:nvSpPr>
+          <p:cNvPr id="26" name="矩形 25">
+            <a:extLst>
+              <a:ext uri="{FF2B5EF4-FFF2-40B4-BE49-F238E27FC236}">
+                <a16:creationId xmlns:a16="http://schemas.microsoft.com/office/drawing/2014/main" id="{CC917AA8-B9F4-4B33-9B96-FD7AA4B0706F}"/>
+              </a:ext>
+            </a:extLst>
+          </p:cNvPr>
+          <p:cNvSpPr/>
+          <p:nvPr/>
+        </p:nvSpPr>
+        <p:spPr>
+          <a:xfrm>
+            <a:off x="980662" y="2365512"/>
+            <a:ext cx="3086835" cy="4085714"/>
+          </a:xfrm>
+          <a:prstGeom prst="rect">
+            <a:avLst/>
+          </a:prstGeom>
+          <a:noFill/>
+          <a:ln w="9525" cap="flat" cmpd="sng" algn="ctr">
+            <a:solidFill>
+              <a:schemeClr val="accent5"/>
+            </a:solidFill>
+            <a:prstDash val="solid"/>
+            <a:round/>
+            <a:headEnd type="none" w="med" len="med"/>
+            <a:tailEnd type="none" w="med" len="med"/>
+          </a:ln>
+        </p:spPr>
+        <p:style>
+          <a:lnRef idx="0">
+            <a:scrgbClr r="0" g="0" b="0"/>
+          </a:lnRef>
+          <a:fillRef idx="0">
+            <a:scrgbClr r="0" g="0" b="0"/>
+          </a:fillRef>
+          <a:effectRef idx="0">
+            <a:scrgbClr r="0" g="0" b="0"/>
+          </a:effectRef>
+          <a:fontRef idx="minor">
+            <a:schemeClr val="accent5"/>
+          </a:fontRef>
+        </p:style>
+        <p:txBody>
+          <a:bodyPr rtlCol="0" anchor="ctr"/>
+          <a:lstStyle/>
+          <a:p>
+            <a:pPr algn="ctr"/>
+            <a:endParaRPr lang="zh-TW" altLang="en-US"/>
+          </a:p>
+        </p:txBody>
+      </p:sp>
+      <p:sp>
+        <p:nvSpPr>
+          <p:cNvPr id="16" name="矩形 4">
+            <a:extLst>
+              <a:ext uri="{FF2B5EF4-FFF2-40B4-BE49-F238E27FC236}">
+                <a16:creationId xmlns:a16="http://schemas.microsoft.com/office/drawing/2014/main" id="{11C6FD80-D0F6-49FC-84BA-8D17ADBCE5AC}"/>
+              </a:ext>
+            </a:extLst>
+          </p:cNvPr>
+          <p:cNvSpPr/>
+          <p:nvPr/>
+        </p:nvSpPr>
+        <p:spPr>
+          <a:xfrm>
+            <a:off x="1205947" y="4784031"/>
+            <a:ext cx="2504661" cy="1417983"/>
+          </a:xfrm>
+          <a:prstGeom prst="rect">
+            <a:avLst/>
+          </a:prstGeom>
+        </p:spPr>
+        <p:style>
+          <a:lnRef idx="2">
+            <a:schemeClr val="accent1">
+              <a:shade val="50000"/>
+            </a:schemeClr>
+          </a:lnRef>
+          <a:fillRef idx="1">
+            <a:schemeClr val="accent1"/>
+          </a:fillRef>
+          <a:effectRef idx="0">
+            <a:schemeClr val="accent1"/>
+          </a:effectRef>
+          <a:fontRef idx="minor">
+            <a:schemeClr val="lt1"/>
+          </a:fontRef>
+        </p:style>
+        <p:txBody>
+          <a:bodyPr rtlCol="0" anchor="ctr"/>
+          <a:lstStyle/>
+          <a:p>
+            <a:pPr algn="ctr"/>
+            <a:r>
+              <a:rPr lang="en-US" altLang="zh-TW" dirty="0"/>
+              <a:t>Split Messages</a:t>
+            </a:r>
+            <a:endParaRPr lang="zh-TW" altLang="en-US" dirty="0"/>
+          </a:p>
+        </p:txBody>
+      </p:sp>
+    </p:spTree>
+    <p:extLst>
+      <p:ext uri="{BB962C8B-B14F-4D97-AF65-F5344CB8AC3E}">
+        <p14:creationId xmlns:p14="http://schemas.microsoft.com/office/powerpoint/2010/main" val="1187691408"/>
       </p:ext>
     </p:extLst>
   </p:cSld>

</xml_diff>